<commit_message>
change figure added pixels calibration
</commit_message>
<xml_diff>
--- a/figures/resources/pixels.pptx
+++ b/figures/resources/pixels.pptx
@@ -5,10 +5,11 @@
     <p:sldMasterId id="2147483648" r:id="rId1"/>
   </p:sldMasterIdLst>
   <p:notesMasterIdLst>
-    <p:notesMasterId r:id="rId3"/>
+    <p:notesMasterId r:id="rId4"/>
   </p:notesMasterIdLst>
   <p:sldIdLst>
     <p:sldId id="262" r:id="rId2"/>
+    <p:sldId id="263" r:id="rId3"/>
   </p:sldIdLst>
   <p:sldSz cx="12192000" cy="6858000"/>
   <p:notesSz cx="6858000" cy="9144000"/>
@@ -107,6 +108,11 @@
       </a:defRPr>
     </a:lvl9pPr>
   </p:defaultTextStyle>
+  <p:extLst>
+    <p:ext uri="{EFAFB233-063F-42B5-8137-9DF3F51BA10A}">
+      <p15:sldGuideLst xmlns:p15="http://schemas.microsoft.com/office/powerpoint/2012/main"/>
+    </p:ext>
+  </p:extLst>
 </p:presentation>
 </file>
 
@@ -192,7 +198,7 @@
           <a:p>
             <a:fld id="{922FCDE8-9265-274C-B63C-E407950C8DE1}" type="datetimeFigureOut">
               <a:rPr lang="de-DE" smtClean="0"/>
-              <a:t>14.12.20</a:t>
+              <a:t>15.01.21</a:t>
             </a:fld>
             <a:endParaRPr lang="de-DE"/>
           </a:p>
@@ -718,7 +724,7 @@
           <a:p>
             <a:fld id="{747B7DA0-53A4-8447-B8D4-5B08E7A75C15}" type="datetimeFigureOut">
               <a:rPr lang="de-DE" smtClean="0"/>
-              <a:t>14.12.20</a:t>
+              <a:t>15.01.21</a:t>
             </a:fld>
             <a:endParaRPr lang="de-DE"/>
           </a:p>
@@ -918,7 +924,7 @@
           <a:p>
             <a:fld id="{747B7DA0-53A4-8447-B8D4-5B08E7A75C15}" type="datetimeFigureOut">
               <a:rPr lang="de-DE" smtClean="0"/>
-              <a:t>14.12.20</a:t>
+              <a:t>15.01.21</a:t>
             </a:fld>
             <a:endParaRPr lang="de-DE"/>
           </a:p>
@@ -1128,7 +1134,7 @@
           <a:p>
             <a:fld id="{747B7DA0-53A4-8447-B8D4-5B08E7A75C15}" type="datetimeFigureOut">
               <a:rPr lang="de-DE" smtClean="0"/>
-              <a:t>14.12.20</a:t>
+              <a:t>15.01.21</a:t>
             </a:fld>
             <a:endParaRPr lang="de-DE"/>
           </a:p>
@@ -1938,7 +1944,7 @@
           <a:p>
             <a:fld id="{747B7DA0-53A4-8447-B8D4-5B08E7A75C15}" type="datetimeFigureOut">
               <a:rPr lang="de-DE" smtClean="0"/>
-              <a:t>14.12.20</a:t>
+              <a:t>15.01.21</a:t>
             </a:fld>
             <a:endParaRPr lang="de-DE"/>
           </a:p>
@@ -2214,7 +2220,7 @@
           <a:p>
             <a:fld id="{747B7DA0-53A4-8447-B8D4-5B08E7A75C15}" type="datetimeFigureOut">
               <a:rPr lang="de-DE" smtClean="0"/>
-              <a:t>14.12.20</a:t>
+              <a:t>15.01.21</a:t>
             </a:fld>
             <a:endParaRPr lang="de-DE"/>
           </a:p>
@@ -2482,7 +2488,7 @@
           <a:p>
             <a:fld id="{747B7DA0-53A4-8447-B8D4-5B08E7A75C15}" type="datetimeFigureOut">
               <a:rPr lang="de-DE" smtClean="0"/>
-              <a:t>14.12.20</a:t>
+              <a:t>15.01.21</a:t>
             </a:fld>
             <a:endParaRPr lang="de-DE"/>
           </a:p>
@@ -2897,7 +2903,7 @@
           <a:p>
             <a:fld id="{747B7DA0-53A4-8447-B8D4-5B08E7A75C15}" type="datetimeFigureOut">
               <a:rPr lang="de-DE" smtClean="0"/>
-              <a:t>14.12.20</a:t>
+              <a:t>15.01.21</a:t>
             </a:fld>
             <a:endParaRPr lang="de-DE"/>
           </a:p>
@@ -3039,7 +3045,7 @@
           <a:p>
             <a:fld id="{747B7DA0-53A4-8447-B8D4-5B08E7A75C15}" type="datetimeFigureOut">
               <a:rPr lang="de-DE" smtClean="0"/>
-              <a:t>14.12.20</a:t>
+              <a:t>15.01.21</a:t>
             </a:fld>
             <a:endParaRPr lang="de-DE"/>
           </a:p>
@@ -3152,7 +3158,7 @@
           <a:p>
             <a:fld id="{747B7DA0-53A4-8447-B8D4-5B08E7A75C15}" type="datetimeFigureOut">
               <a:rPr lang="de-DE" smtClean="0"/>
-              <a:t>14.12.20</a:t>
+              <a:t>15.01.21</a:t>
             </a:fld>
             <a:endParaRPr lang="de-DE"/>
           </a:p>
@@ -3465,7 +3471,7 @@
           <a:p>
             <a:fld id="{747B7DA0-53A4-8447-B8D4-5B08E7A75C15}" type="datetimeFigureOut">
               <a:rPr lang="de-DE" smtClean="0"/>
-              <a:t>14.12.20</a:t>
+              <a:t>15.01.21</a:t>
             </a:fld>
             <a:endParaRPr lang="de-DE"/>
           </a:p>
@@ -3754,7 +3760,7 @@
           <a:p>
             <a:fld id="{747B7DA0-53A4-8447-B8D4-5B08E7A75C15}" type="datetimeFigureOut">
               <a:rPr lang="de-DE" smtClean="0"/>
-              <a:t>14.12.20</a:t>
+              <a:t>15.01.21</a:t>
             </a:fld>
             <a:endParaRPr lang="de-DE"/>
           </a:p>
@@ -3997,7 +4003,7 @@
           <a:p>
             <a:fld id="{747B7DA0-53A4-8447-B8D4-5B08E7A75C15}" type="datetimeFigureOut">
               <a:rPr lang="de-DE" smtClean="0"/>
-              <a:t>14.12.20</a:t>
+              <a:t>15.01.21</a:t>
             </a:fld>
             <a:endParaRPr lang="de-DE"/>
           </a:p>
@@ -4720,6 +4726,464 @@
     <p:extLst>
       <p:ext uri="{BB962C8B-B14F-4D97-AF65-F5344CB8AC3E}">
         <p14:creationId xmlns:p14="http://schemas.microsoft.com/office/powerpoint/2010/main" val="3603261826"/>
+      </p:ext>
+    </p:extLst>
+  </p:cSld>
+  <p:clrMapOvr>
+    <a:masterClrMapping/>
+  </p:clrMapOvr>
+</p:sld>
+</file>
+
+<file path=ppt/slides/slide2.xml><?xml version="1.0" encoding="utf-8"?>
+<p:sld xmlns:a="http://schemas.openxmlformats.org/drawingml/2006/main" xmlns:r="http://schemas.openxmlformats.org/officeDocument/2006/relationships" xmlns:p="http://schemas.openxmlformats.org/presentationml/2006/main">
+  <p:cSld>
+    <p:spTree>
+      <p:nvGrpSpPr>
+        <p:cNvPr id="1" name=""/>
+        <p:cNvGrpSpPr/>
+        <p:nvPr/>
+      </p:nvGrpSpPr>
+      <p:grpSpPr>
+        <a:xfrm>
+          <a:off x="0" y="0"/>
+          <a:ext cx="0" cy="0"/>
+          <a:chOff x="0" y="0"/>
+          <a:chExt cx="0" cy="0"/>
+        </a:xfrm>
+      </p:grpSpPr>
+      <p:pic>
+        <p:nvPicPr>
+          <p:cNvPr id="4" name="Picture 3">
+            <a:extLst>
+              <a:ext uri="{FF2B5EF4-FFF2-40B4-BE49-F238E27FC236}">
+                <a16:creationId xmlns:a16="http://schemas.microsoft.com/office/drawing/2014/main" id="{A3B673F2-B77A-4343-982D-785AF5492702}"/>
+              </a:ext>
+            </a:extLst>
+          </p:cNvPr>
+          <p:cNvPicPr>
+            <a:picLocks noChangeAspect="1"/>
+          </p:cNvPicPr>
+          <p:nvPr/>
+        </p:nvPicPr>
+        <p:blipFill>
+          <a:blip r:embed="rId2"/>
+          <a:stretch>
+            <a:fillRect/>
+          </a:stretch>
+        </p:blipFill>
+        <p:spPr>
+          <a:xfrm>
+            <a:off x="6592209" y="1142724"/>
+            <a:ext cx="5071311" cy="5071311"/>
+          </a:xfrm>
+          <a:prstGeom prst="rect">
+            <a:avLst/>
+          </a:prstGeom>
+        </p:spPr>
+      </p:pic>
+      <p:grpSp>
+        <p:nvGrpSpPr>
+          <p:cNvPr id="6" name="Group 5">
+            <a:extLst>
+              <a:ext uri="{FF2B5EF4-FFF2-40B4-BE49-F238E27FC236}">
+                <a16:creationId xmlns:a16="http://schemas.microsoft.com/office/drawing/2014/main" id="{DB8D540C-B33F-0D4C-BBC5-2AE604C3EA29}"/>
+              </a:ext>
+            </a:extLst>
+          </p:cNvPr>
+          <p:cNvGrpSpPr/>
+          <p:nvPr/>
+        </p:nvGrpSpPr>
+        <p:grpSpPr>
+          <a:xfrm>
+            <a:off x="198424" y="875069"/>
+            <a:ext cx="5821444" cy="5844090"/>
+            <a:chOff x="198423" y="505737"/>
+            <a:chExt cx="6189345" cy="6213422"/>
+          </a:xfrm>
+        </p:grpSpPr>
+        <p:pic>
+          <p:nvPicPr>
+            <p:cNvPr id="7" name="Picture 6">
+              <a:extLst>
+                <a:ext uri="{FF2B5EF4-FFF2-40B4-BE49-F238E27FC236}">
+                  <a16:creationId xmlns:a16="http://schemas.microsoft.com/office/drawing/2014/main" id="{6FA7C2E7-8382-E64B-90E0-EA425700CBE6}"/>
+                </a:ext>
+              </a:extLst>
+            </p:cNvPr>
+            <p:cNvPicPr>
+              <a:picLocks noChangeAspect="1"/>
+            </p:cNvPicPr>
+            <p:nvPr/>
+          </p:nvPicPr>
+          <p:blipFill>
+            <a:blip r:embed="rId3"/>
+            <a:stretch>
+              <a:fillRect/>
+            </a:stretch>
+          </p:blipFill>
+          <p:spPr>
+            <a:xfrm>
+              <a:off x="672768" y="1004159"/>
+              <a:ext cx="5715000" cy="5715000"/>
+            </a:xfrm>
+            <a:prstGeom prst="rect">
+              <a:avLst/>
+            </a:prstGeom>
+          </p:spPr>
+        </p:pic>
+        <p:cxnSp>
+          <p:nvCxnSpPr>
+            <p:cNvPr id="8" name="Straight Arrow Connector 7">
+              <a:extLst>
+                <a:ext uri="{FF2B5EF4-FFF2-40B4-BE49-F238E27FC236}">
+                  <a16:creationId xmlns:a16="http://schemas.microsoft.com/office/drawing/2014/main" id="{1396876B-A24A-B94B-B6FC-BA8612248A7A}"/>
+                </a:ext>
+              </a:extLst>
+            </p:cNvPr>
+            <p:cNvCxnSpPr>
+              <a:cxnSpLocks/>
+            </p:cNvCxnSpPr>
+            <p:nvPr/>
+          </p:nvCxnSpPr>
+          <p:spPr>
+            <a:xfrm>
+              <a:off x="672768" y="875069"/>
+              <a:ext cx="5715000" cy="0"/>
+            </a:xfrm>
+            <a:prstGeom prst="straightConnector1">
+              <a:avLst/>
+            </a:prstGeom>
+            <a:ln w="57150">
+              <a:solidFill>
+                <a:schemeClr val="accent1"/>
+              </a:solidFill>
+              <a:tailEnd type="triangle"/>
+            </a:ln>
+          </p:spPr>
+          <p:style>
+            <a:lnRef idx="1">
+              <a:schemeClr val="accent1"/>
+            </a:lnRef>
+            <a:fillRef idx="0">
+              <a:schemeClr val="accent1"/>
+            </a:fillRef>
+            <a:effectRef idx="0">
+              <a:schemeClr val="accent1"/>
+            </a:effectRef>
+            <a:fontRef idx="minor">
+              <a:schemeClr val="tx1"/>
+            </a:fontRef>
+          </p:style>
+        </p:cxnSp>
+        <p:cxnSp>
+          <p:nvCxnSpPr>
+            <p:cNvPr id="9" name="Straight Arrow Connector 8">
+              <a:extLst>
+                <a:ext uri="{FF2B5EF4-FFF2-40B4-BE49-F238E27FC236}">
+                  <a16:creationId xmlns:a16="http://schemas.microsoft.com/office/drawing/2014/main" id="{433BB69E-960F-F944-9D2B-6DA3E918B747}"/>
+                </a:ext>
+              </a:extLst>
+            </p:cNvPr>
+            <p:cNvCxnSpPr>
+              <a:cxnSpLocks/>
+            </p:cNvCxnSpPr>
+            <p:nvPr/>
+          </p:nvCxnSpPr>
+          <p:spPr>
+            <a:xfrm>
+              <a:off x="554455" y="1004159"/>
+              <a:ext cx="0" cy="5715000"/>
+            </a:xfrm>
+            <a:prstGeom prst="straightConnector1">
+              <a:avLst/>
+            </a:prstGeom>
+            <a:ln w="57150">
+              <a:solidFill>
+                <a:schemeClr val="accent1"/>
+              </a:solidFill>
+              <a:tailEnd type="triangle"/>
+            </a:ln>
+          </p:spPr>
+          <p:style>
+            <a:lnRef idx="1">
+              <a:schemeClr val="accent1"/>
+            </a:lnRef>
+            <a:fillRef idx="0">
+              <a:schemeClr val="accent1"/>
+            </a:fillRef>
+            <a:effectRef idx="0">
+              <a:schemeClr val="accent1"/>
+            </a:effectRef>
+            <a:fontRef idx="minor">
+              <a:schemeClr val="tx1"/>
+            </a:fontRef>
+          </p:style>
+        </p:cxnSp>
+        <p:sp>
+          <p:nvSpPr>
+            <p:cNvPr id="10" name="TextBox 9">
+              <a:extLst>
+                <a:ext uri="{FF2B5EF4-FFF2-40B4-BE49-F238E27FC236}">
+                  <a16:creationId xmlns:a16="http://schemas.microsoft.com/office/drawing/2014/main" id="{704F1E35-FB52-5042-8488-19ABB1032222}"/>
+                </a:ext>
+              </a:extLst>
+            </p:cNvPr>
+            <p:cNvSpPr txBox="1"/>
+            <p:nvPr/>
+          </p:nvSpPr>
+          <p:spPr>
+            <a:xfrm>
+              <a:off x="672768" y="505737"/>
+              <a:ext cx="304892" cy="369332"/>
+            </a:xfrm>
+            <a:prstGeom prst="rect">
+              <a:avLst/>
+            </a:prstGeom>
+            <a:noFill/>
+          </p:spPr>
+          <p:txBody>
+            <a:bodyPr wrap="square" rtlCol="0">
+              <a:spAutoFit/>
+            </a:bodyPr>
+            <a:lstStyle/>
+            <a:p>
+              <a:r>
+                <a:rPr lang="de-DE" i="1" dirty="0"/>
+                <a:t>X</a:t>
+              </a:r>
+            </a:p>
+          </p:txBody>
+        </p:sp>
+        <p:sp>
+          <p:nvSpPr>
+            <p:cNvPr id="11" name="TextBox 10">
+              <a:extLst>
+                <a:ext uri="{FF2B5EF4-FFF2-40B4-BE49-F238E27FC236}">
+                  <a16:creationId xmlns:a16="http://schemas.microsoft.com/office/drawing/2014/main" id="{3E406B24-6950-0D41-B489-44846BBDA07D}"/>
+                </a:ext>
+              </a:extLst>
+            </p:cNvPr>
+            <p:cNvSpPr txBox="1"/>
+            <p:nvPr/>
+          </p:nvSpPr>
+          <p:spPr>
+            <a:xfrm>
+              <a:off x="198423" y="1170344"/>
+              <a:ext cx="296876" cy="369332"/>
+            </a:xfrm>
+            <a:prstGeom prst="rect">
+              <a:avLst/>
+            </a:prstGeom>
+            <a:noFill/>
+          </p:spPr>
+          <p:txBody>
+            <a:bodyPr wrap="square" rtlCol="0">
+              <a:spAutoFit/>
+            </a:bodyPr>
+            <a:lstStyle/>
+            <a:p>
+              <a:r>
+                <a:rPr lang="de-DE" i="1" dirty="0"/>
+                <a:t>Y</a:t>
+              </a:r>
+            </a:p>
+          </p:txBody>
+        </p:sp>
+      </p:grpSp>
+      <p:sp>
+        <p:nvSpPr>
+          <p:cNvPr id="12" name="Title 5">
+            <a:extLst>
+              <a:ext uri="{FF2B5EF4-FFF2-40B4-BE49-F238E27FC236}">
+                <a16:creationId xmlns:a16="http://schemas.microsoft.com/office/drawing/2014/main" id="{966DD198-A35B-9045-8ACC-4F9541F43602}"/>
+              </a:ext>
+            </a:extLst>
+          </p:cNvPr>
+          <p:cNvSpPr txBox="1">
+            <a:spLocks/>
+          </p:cNvSpPr>
+          <p:nvPr/>
+        </p:nvSpPr>
+        <p:spPr>
+          <a:xfrm>
+            <a:off x="838200" y="365126"/>
+            <a:ext cx="10515600" cy="809740"/>
+          </a:xfrm>
+          <a:prstGeom prst="rect">
+            <a:avLst/>
+          </a:prstGeom>
+        </p:spPr>
+        <p:txBody>
+          <a:bodyPr/>
+          <a:lstStyle>
+            <a:lvl1pPr algn="l" defTabSz="914400" rtl="0" eaLnBrk="1" latinLnBrk="0" hangingPunct="1">
+              <a:lnSpc>
+                <a:spcPct val="90000"/>
+              </a:lnSpc>
+              <a:spcBef>
+                <a:spcPct val="0"/>
+              </a:spcBef>
+              <a:buNone/>
+              <a:defRPr sz="4400" kern="1200">
+                <a:solidFill>
+                  <a:schemeClr val="tx1"/>
+                </a:solidFill>
+                <a:latin typeface="+mj-lt"/>
+                <a:ea typeface="+mj-ea"/>
+                <a:cs typeface="+mj-cs"/>
+              </a:defRPr>
+            </a:lvl1pPr>
+          </a:lstStyle>
+          <a:p>
+            <a:r>
+              <a:rPr lang="de-DE"/>
+              <a:t>Image coordinates and values</a:t>
+            </a:r>
+            <a:endParaRPr lang="de-DE" dirty="0"/>
+          </a:p>
+        </p:txBody>
+      </p:sp>
+      <p:cxnSp>
+        <p:nvCxnSpPr>
+          <p:cNvPr id="14" name="Straight Connector 13">
+            <a:extLst>
+              <a:ext uri="{FF2B5EF4-FFF2-40B4-BE49-F238E27FC236}">
+                <a16:creationId xmlns:a16="http://schemas.microsoft.com/office/drawing/2014/main" id="{A1B505FA-4686-FF46-9755-0DF3C8573840}"/>
+              </a:ext>
+            </a:extLst>
+          </p:cNvPr>
+          <p:cNvCxnSpPr/>
+          <p:nvPr/>
+        </p:nvCxnSpPr>
+        <p:spPr>
+          <a:xfrm flipV="1">
+            <a:off x="5053914" y="1343864"/>
+            <a:ext cx="1538295" cy="756785"/>
+          </a:xfrm>
+          <a:prstGeom prst="line">
+            <a:avLst/>
+          </a:prstGeom>
+          <a:ln w="38100">
+            <a:solidFill>
+              <a:srgbClr val="FF0000"/>
+            </a:solidFill>
+          </a:ln>
+        </p:spPr>
+        <p:style>
+          <a:lnRef idx="1">
+            <a:schemeClr val="accent1"/>
+          </a:lnRef>
+          <a:fillRef idx="0">
+            <a:schemeClr val="accent1"/>
+          </a:fillRef>
+          <a:effectRef idx="0">
+            <a:schemeClr val="accent1"/>
+          </a:effectRef>
+          <a:fontRef idx="minor">
+            <a:schemeClr val="tx1"/>
+          </a:fontRef>
+        </p:style>
+      </p:cxnSp>
+      <p:sp>
+        <p:nvSpPr>
+          <p:cNvPr id="15" name="Rectangle 14">
+            <a:extLst>
+              <a:ext uri="{FF2B5EF4-FFF2-40B4-BE49-F238E27FC236}">
+                <a16:creationId xmlns:a16="http://schemas.microsoft.com/office/drawing/2014/main" id="{2B55F287-8DCF-B44F-B7A7-7E1ED0E75CA9}"/>
+              </a:ext>
+            </a:extLst>
+          </p:cNvPr>
+          <p:cNvSpPr/>
+          <p:nvPr/>
+        </p:nvSpPr>
+        <p:spPr>
+          <a:xfrm>
+            <a:off x="6612110" y="1356221"/>
+            <a:ext cx="5030875" cy="4612093"/>
+          </a:xfrm>
+          <a:prstGeom prst="rect">
+            <a:avLst/>
+          </a:prstGeom>
+          <a:noFill/>
+          <a:ln w="38100">
+            <a:solidFill>
+              <a:srgbClr val="FF0000"/>
+            </a:solidFill>
+          </a:ln>
+        </p:spPr>
+        <p:style>
+          <a:lnRef idx="2">
+            <a:schemeClr val="accent1">
+              <a:shade val="50000"/>
+            </a:schemeClr>
+          </a:lnRef>
+          <a:fillRef idx="1">
+            <a:schemeClr val="accent1"/>
+          </a:fillRef>
+          <a:effectRef idx="0">
+            <a:schemeClr val="accent1"/>
+          </a:effectRef>
+          <a:fontRef idx="minor">
+            <a:schemeClr val="lt1"/>
+          </a:fontRef>
+        </p:style>
+        <p:txBody>
+          <a:bodyPr rtlCol="0" anchor="ctr"/>
+          <a:lstStyle/>
+          <a:p>
+            <a:pPr algn="ctr"/>
+            <a:endParaRPr lang="en-DE"/>
+          </a:p>
+        </p:txBody>
+      </p:sp>
+      <p:cxnSp>
+        <p:nvCxnSpPr>
+          <p:cNvPr id="16" name="Straight Connector 15">
+            <a:extLst>
+              <a:ext uri="{FF2B5EF4-FFF2-40B4-BE49-F238E27FC236}">
+                <a16:creationId xmlns:a16="http://schemas.microsoft.com/office/drawing/2014/main" id="{3540E809-2817-0346-ABBE-92E0BE70201B}"/>
+              </a:ext>
+            </a:extLst>
+          </p:cNvPr>
+          <p:cNvCxnSpPr>
+            <a:cxnSpLocks/>
+          </p:cNvCxnSpPr>
+          <p:nvPr/>
+        </p:nvCxnSpPr>
+        <p:spPr>
+          <a:xfrm>
+            <a:off x="5053280" y="3336324"/>
+            <a:ext cx="1538295" cy="2631990"/>
+          </a:xfrm>
+          <a:prstGeom prst="line">
+            <a:avLst/>
+          </a:prstGeom>
+          <a:ln w="38100">
+            <a:solidFill>
+              <a:srgbClr val="FF0000"/>
+            </a:solidFill>
+          </a:ln>
+        </p:spPr>
+        <p:style>
+          <a:lnRef idx="1">
+            <a:schemeClr val="accent1"/>
+          </a:lnRef>
+          <a:fillRef idx="0">
+            <a:schemeClr val="accent1"/>
+          </a:fillRef>
+          <a:effectRef idx="0">
+            <a:schemeClr val="accent1"/>
+          </a:effectRef>
+          <a:fontRef idx="minor">
+            <a:schemeClr val="tx1"/>
+          </a:fontRef>
+        </p:style>
+      </p:cxnSp>
+    </p:spTree>
+    <p:extLst>
+      <p:ext uri="{BB962C8B-B14F-4D97-AF65-F5344CB8AC3E}">
+        <p14:creationId xmlns:p14="http://schemas.microsoft.com/office/powerpoint/2010/main" val="2578052622"/>
       </p:ext>
     </p:extLst>
   </p:cSld>

</xml_diff>

<commit_message>
Revert "Merge branch 'image_file_formats'"
This reverts commit 8c7b0ab71364786da035b57091d94ef413d655c2, reversing
changes made to 7a26674f328953ef83f9e731fc5ae69086169ec8.
</commit_message>
<xml_diff>
--- a/figures/resources/pixels.pptx
+++ b/figures/resources/pixels.pptx
@@ -5,12 +5,11 @@
     <p:sldMasterId id="2147483648" r:id="rId1"/>
   </p:sldMasterIdLst>
   <p:notesMasterIdLst>
-    <p:notesMasterId r:id="rId5"/>
+    <p:notesMasterId r:id="rId4"/>
   </p:notesMasterIdLst>
   <p:sldIdLst>
     <p:sldId id="262" r:id="rId2"/>
     <p:sldId id="263" r:id="rId3"/>
-    <p:sldId id="264" r:id="rId4"/>
   </p:sldIdLst>
   <p:sldSz cx="12192000" cy="6858000"/>
   <p:notesSz cx="6858000" cy="9144000"/>
@@ -199,7 +198,7 @@
           <a:p>
             <a:fld id="{922FCDE8-9265-274C-B63C-E407950C8DE1}" type="datetimeFigureOut">
               <a:rPr lang="de-DE" smtClean="0"/>
-              <a:t>04.01.22</a:t>
+              <a:t>15.01.21</a:t>
             </a:fld>
             <a:endParaRPr lang="de-DE"/>
           </a:p>
@@ -725,7 +724,7 @@
           <a:p>
             <a:fld id="{747B7DA0-53A4-8447-B8D4-5B08E7A75C15}" type="datetimeFigureOut">
               <a:rPr lang="de-DE" smtClean="0"/>
-              <a:t>04.01.22</a:t>
+              <a:t>15.01.21</a:t>
             </a:fld>
             <a:endParaRPr lang="de-DE"/>
           </a:p>
@@ -925,7 +924,7 @@
           <a:p>
             <a:fld id="{747B7DA0-53A4-8447-B8D4-5B08E7A75C15}" type="datetimeFigureOut">
               <a:rPr lang="de-DE" smtClean="0"/>
-              <a:t>04.01.22</a:t>
+              <a:t>15.01.21</a:t>
             </a:fld>
             <a:endParaRPr lang="de-DE"/>
           </a:p>
@@ -1135,7 +1134,7 @@
           <a:p>
             <a:fld id="{747B7DA0-53A4-8447-B8D4-5B08E7A75C15}" type="datetimeFigureOut">
               <a:rPr lang="de-DE" smtClean="0"/>
-              <a:t>04.01.22</a:t>
+              <a:t>15.01.21</a:t>
             </a:fld>
             <a:endParaRPr lang="de-DE"/>
           </a:p>
@@ -1945,7 +1944,7 @@
           <a:p>
             <a:fld id="{747B7DA0-53A4-8447-B8D4-5B08E7A75C15}" type="datetimeFigureOut">
               <a:rPr lang="de-DE" smtClean="0"/>
-              <a:t>04.01.22</a:t>
+              <a:t>15.01.21</a:t>
             </a:fld>
             <a:endParaRPr lang="de-DE"/>
           </a:p>
@@ -2221,7 +2220,7 @@
           <a:p>
             <a:fld id="{747B7DA0-53A4-8447-B8D4-5B08E7A75C15}" type="datetimeFigureOut">
               <a:rPr lang="de-DE" smtClean="0"/>
-              <a:t>04.01.22</a:t>
+              <a:t>15.01.21</a:t>
             </a:fld>
             <a:endParaRPr lang="de-DE"/>
           </a:p>
@@ -2489,7 +2488,7 @@
           <a:p>
             <a:fld id="{747B7DA0-53A4-8447-B8D4-5B08E7A75C15}" type="datetimeFigureOut">
               <a:rPr lang="de-DE" smtClean="0"/>
-              <a:t>04.01.22</a:t>
+              <a:t>15.01.21</a:t>
             </a:fld>
             <a:endParaRPr lang="de-DE"/>
           </a:p>
@@ -2904,7 +2903,7 @@
           <a:p>
             <a:fld id="{747B7DA0-53A4-8447-B8D4-5B08E7A75C15}" type="datetimeFigureOut">
               <a:rPr lang="de-DE" smtClean="0"/>
-              <a:t>04.01.22</a:t>
+              <a:t>15.01.21</a:t>
             </a:fld>
             <a:endParaRPr lang="de-DE"/>
           </a:p>
@@ -3046,7 +3045,7 @@
           <a:p>
             <a:fld id="{747B7DA0-53A4-8447-B8D4-5B08E7A75C15}" type="datetimeFigureOut">
               <a:rPr lang="de-DE" smtClean="0"/>
-              <a:t>04.01.22</a:t>
+              <a:t>15.01.21</a:t>
             </a:fld>
             <a:endParaRPr lang="de-DE"/>
           </a:p>
@@ -3159,7 +3158,7 @@
           <a:p>
             <a:fld id="{747B7DA0-53A4-8447-B8D4-5B08E7A75C15}" type="datetimeFigureOut">
               <a:rPr lang="de-DE" smtClean="0"/>
-              <a:t>04.01.22</a:t>
+              <a:t>15.01.21</a:t>
             </a:fld>
             <a:endParaRPr lang="de-DE"/>
           </a:p>
@@ -3472,7 +3471,7 @@
           <a:p>
             <a:fld id="{747B7DA0-53A4-8447-B8D4-5B08E7A75C15}" type="datetimeFigureOut">
               <a:rPr lang="de-DE" smtClean="0"/>
-              <a:t>04.01.22</a:t>
+              <a:t>15.01.21</a:t>
             </a:fld>
             <a:endParaRPr lang="de-DE"/>
           </a:p>
@@ -3761,7 +3760,7 @@
           <a:p>
             <a:fld id="{747B7DA0-53A4-8447-B8D4-5B08E7A75C15}" type="datetimeFigureOut">
               <a:rPr lang="de-DE" smtClean="0"/>
-              <a:t>04.01.22</a:t>
+              <a:t>15.01.21</a:t>
             </a:fld>
             <a:endParaRPr lang="de-DE"/>
           </a:p>
@@ -4004,7 +4003,7 @@
           <a:p>
             <a:fld id="{747B7DA0-53A4-8447-B8D4-5B08E7A75C15}" type="datetimeFigureOut">
               <a:rPr lang="de-DE" smtClean="0"/>
-              <a:t>04.01.22</a:t>
+              <a:t>15.01.21</a:t>
             </a:fld>
             <a:endParaRPr lang="de-DE"/>
           </a:p>
@@ -5185,272 +5184,6 @@
     <p:extLst>
       <p:ext uri="{BB962C8B-B14F-4D97-AF65-F5344CB8AC3E}">
         <p14:creationId xmlns:p14="http://schemas.microsoft.com/office/powerpoint/2010/main" val="2578052622"/>
-      </p:ext>
-    </p:extLst>
-  </p:cSld>
-  <p:clrMapOvr>
-    <a:masterClrMapping/>
-  </p:clrMapOvr>
-</p:sld>
-</file>
-
-<file path=ppt/slides/slide3.xml><?xml version="1.0" encoding="utf-8"?>
-<p:sld xmlns:a="http://schemas.openxmlformats.org/drawingml/2006/main" xmlns:r="http://schemas.openxmlformats.org/officeDocument/2006/relationships" xmlns:p="http://schemas.openxmlformats.org/presentationml/2006/main">
-  <p:cSld>
-    <p:spTree>
-      <p:nvGrpSpPr>
-        <p:cNvPr id="1" name=""/>
-        <p:cNvGrpSpPr/>
-        <p:nvPr/>
-      </p:nvGrpSpPr>
-      <p:grpSpPr>
-        <a:xfrm>
-          <a:off x="0" y="0"/>
-          <a:ext cx="0" cy="0"/>
-          <a:chOff x="0" y="0"/>
-          <a:chExt cx="0" cy="0"/>
-        </a:xfrm>
-      </p:grpSpPr>
-      <p:cxnSp>
-        <p:nvCxnSpPr>
-          <p:cNvPr id="5" name="Straight Arrow Connector 4">
-            <a:extLst>
-              <a:ext uri="{FF2B5EF4-FFF2-40B4-BE49-F238E27FC236}">
-                <a16:creationId xmlns:a16="http://schemas.microsoft.com/office/drawing/2014/main" id="{66BD0E45-CABC-804D-8D25-C2CFF26C895E}"/>
-              </a:ext>
-            </a:extLst>
-          </p:cNvPr>
-          <p:cNvCxnSpPr>
-            <a:cxnSpLocks/>
-          </p:cNvCxnSpPr>
-          <p:nvPr/>
-        </p:nvCxnSpPr>
-        <p:spPr>
-          <a:xfrm>
-            <a:off x="584092" y="846661"/>
-            <a:ext cx="0" cy="2590806"/>
-          </a:xfrm>
-          <a:prstGeom prst="straightConnector1">
-            <a:avLst/>
-          </a:prstGeom>
-          <a:ln w="12700">
-            <a:solidFill>
-              <a:srgbClr val="00B050"/>
-            </a:solidFill>
-            <a:tailEnd type="triangle"/>
-          </a:ln>
-        </p:spPr>
-        <p:style>
-          <a:lnRef idx="1">
-            <a:schemeClr val="accent1"/>
-          </a:lnRef>
-          <a:fillRef idx="0">
-            <a:schemeClr val="accent1"/>
-          </a:fillRef>
-          <a:effectRef idx="0">
-            <a:schemeClr val="accent1"/>
-          </a:effectRef>
-          <a:fontRef idx="minor">
-            <a:schemeClr val="tx1"/>
-          </a:fontRef>
-        </p:style>
-      </p:cxnSp>
-      <p:cxnSp>
-        <p:nvCxnSpPr>
-          <p:cNvPr id="9" name="Straight Arrow Connector 8">
-            <a:extLst>
-              <a:ext uri="{FF2B5EF4-FFF2-40B4-BE49-F238E27FC236}">
-                <a16:creationId xmlns:a16="http://schemas.microsoft.com/office/drawing/2014/main" id="{F7E9A8D0-76F2-4A4B-9C2A-A64A90051014}"/>
-              </a:ext>
-            </a:extLst>
-          </p:cNvPr>
-          <p:cNvCxnSpPr>
-            <a:cxnSpLocks/>
-          </p:cNvCxnSpPr>
-          <p:nvPr/>
-        </p:nvCxnSpPr>
-        <p:spPr>
-          <a:xfrm>
-            <a:off x="584092" y="846661"/>
-            <a:ext cx="2582441" cy="0"/>
-          </a:xfrm>
-          <a:prstGeom prst="straightConnector1">
-            <a:avLst/>
-          </a:prstGeom>
-          <a:ln w="12700">
-            <a:solidFill>
-              <a:srgbClr val="00B050"/>
-            </a:solidFill>
-            <a:tailEnd type="triangle"/>
-          </a:ln>
-        </p:spPr>
-        <p:style>
-          <a:lnRef idx="1">
-            <a:schemeClr val="accent1"/>
-          </a:lnRef>
-          <a:fillRef idx="0">
-            <a:schemeClr val="accent1"/>
-          </a:fillRef>
-          <a:effectRef idx="0">
-            <a:schemeClr val="accent1"/>
-          </a:effectRef>
-          <a:fontRef idx="minor">
-            <a:schemeClr val="tx1"/>
-          </a:fontRef>
-        </p:style>
-      </p:cxnSp>
-      <p:pic>
-        <p:nvPicPr>
-          <p:cNvPr id="17" name="Picture 16">
-            <a:extLst>
-              <a:ext uri="{FF2B5EF4-FFF2-40B4-BE49-F238E27FC236}">
-                <a16:creationId xmlns:a16="http://schemas.microsoft.com/office/drawing/2014/main" id="{BB314DCA-3E68-B54E-83EE-7AEEAC80664F}"/>
-              </a:ext>
-            </a:extLst>
-          </p:cNvPr>
-          <p:cNvPicPr>
-            <a:picLocks noChangeAspect="1"/>
-          </p:cNvPicPr>
-          <p:nvPr/>
-        </p:nvPicPr>
-        <p:blipFill>
-          <a:blip r:embed="rId2"/>
-          <a:stretch>
-            <a:fillRect/>
-          </a:stretch>
-        </p:blipFill>
-        <p:spPr>
-          <a:xfrm>
-            <a:off x="686977" y="968196"/>
-            <a:ext cx="5475474" cy="5213350"/>
-          </a:xfrm>
-          <a:prstGeom prst="rect">
-            <a:avLst/>
-          </a:prstGeom>
-        </p:spPr>
-      </p:pic>
-      <p:sp>
-        <p:nvSpPr>
-          <p:cNvPr id="24" name="TextBox 23">
-            <a:extLst>
-              <a:ext uri="{FF2B5EF4-FFF2-40B4-BE49-F238E27FC236}">
-                <a16:creationId xmlns:a16="http://schemas.microsoft.com/office/drawing/2014/main" id="{50BF9018-AB62-3C40-A443-5ADFD14B3AD8}"/>
-              </a:ext>
-            </a:extLst>
-          </p:cNvPr>
-          <p:cNvSpPr txBox="1"/>
-          <p:nvPr/>
-        </p:nvSpPr>
-        <p:spPr>
-          <a:xfrm>
-            <a:off x="897467" y="433495"/>
-            <a:ext cx="543739" cy="369332"/>
-          </a:xfrm>
-          <a:prstGeom prst="rect">
-            <a:avLst/>
-          </a:prstGeom>
-          <a:noFill/>
-        </p:spPr>
-        <p:txBody>
-          <a:bodyPr wrap="none" rtlCol="0">
-            <a:spAutoFit/>
-          </a:bodyPr>
-          <a:lstStyle/>
-          <a:p>
-            <a:r>
-              <a:rPr lang="de-DE" dirty="0" err="1">
-                <a:solidFill>
-                  <a:srgbClr val="00B050"/>
-                </a:solidFill>
-              </a:rPr>
-              <a:t>dim</a:t>
-            </a:r>
-            <a:endParaRPr lang="de-DE" sz="1200" dirty="0">
-              <a:solidFill>
-                <a:srgbClr val="00B050"/>
-              </a:solidFill>
-            </a:endParaRPr>
-          </a:p>
-        </p:txBody>
-      </p:sp>
-      <p:sp>
-        <p:nvSpPr>
-          <p:cNvPr id="25" name="TextBox 24">
-            <a:extLst>
-              <a:ext uri="{FF2B5EF4-FFF2-40B4-BE49-F238E27FC236}">
-                <a16:creationId xmlns:a16="http://schemas.microsoft.com/office/drawing/2014/main" id="{C7FF701D-C920-B445-9AAB-F658DCFCAF7C}"/>
-              </a:ext>
-            </a:extLst>
-          </p:cNvPr>
-          <p:cNvSpPr txBox="1"/>
-          <p:nvPr/>
-        </p:nvSpPr>
-        <p:spPr>
-          <a:xfrm rot="16200000">
-            <a:off x="101598" y="1347896"/>
-            <a:ext cx="543739" cy="369332"/>
-          </a:xfrm>
-          <a:prstGeom prst="rect">
-            <a:avLst/>
-          </a:prstGeom>
-          <a:noFill/>
-        </p:spPr>
-        <p:txBody>
-          <a:bodyPr wrap="none" rtlCol="0">
-            <a:spAutoFit/>
-          </a:bodyPr>
-          <a:lstStyle/>
-          <a:p>
-            <a:r>
-              <a:rPr lang="de-DE" dirty="0" err="1">
-                <a:solidFill>
-                  <a:srgbClr val="00B050"/>
-                </a:solidFill>
-              </a:rPr>
-              <a:t>dim</a:t>
-            </a:r>
-            <a:endParaRPr lang="de-DE" sz="1200" dirty="0">
-              <a:solidFill>
-                <a:srgbClr val="00B050"/>
-              </a:solidFill>
-            </a:endParaRPr>
-          </a:p>
-        </p:txBody>
-      </p:sp>
-      <p:pic>
-        <p:nvPicPr>
-          <p:cNvPr id="27" name="Picture 26">
-            <a:extLst>
-              <a:ext uri="{FF2B5EF4-FFF2-40B4-BE49-F238E27FC236}">
-                <a16:creationId xmlns:a16="http://schemas.microsoft.com/office/drawing/2014/main" id="{8055BAB8-195F-8643-A44B-025E4982705B}"/>
-              </a:ext>
-            </a:extLst>
-          </p:cNvPr>
-          <p:cNvPicPr>
-            <a:picLocks noChangeAspect="1"/>
-          </p:cNvPicPr>
-          <p:nvPr/>
-        </p:nvPicPr>
-        <p:blipFill>
-          <a:blip r:embed="rId3"/>
-          <a:stretch>
-            <a:fillRect/>
-          </a:stretch>
-        </p:blipFill>
-        <p:spPr>
-          <a:xfrm>
-            <a:off x="6502403" y="566032"/>
-            <a:ext cx="5029198" cy="5508862"/>
-          </a:xfrm>
-          <a:prstGeom prst="rect">
-            <a:avLst/>
-          </a:prstGeom>
-        </p:spPr>
-      </p:pic>
-    </p:spTree>
-    <p:extLst>
-      <p:ext uri="{BB962C8B-B14F-4D97-AF65-F5344CB8AC3E}">
-        <p14:creationId xmlns:p14="http://schemas.microsoft.com/office/powerpoint/2010/main" val="3681506025"/>
       </p:ext>
     </p:extLst>
   </p:cSld>

</xml_diff>